<commit_message>
Commit new lecture of JS with parth of Array section
</commit_message>
<xml_diff>
--- a/WebLecture/Lecture14-Javascript5.pptx
+++ b/WebLecture/Lecture14-Javascript5.pptx
@@ -225,7 +225,7 @@
             <a:fld id="{8BEFEC64-3B02-48AC-B709-B2823D518D38}" type="datetimeFigureOut">
               <a:rPr lang="zh-CN" altLang="en-US" smtClean="0"/>
               <a:pPr/>
-              <a:t>2022/3/11</a:t>
+              <a:t>2022/3/12</a:t>
             </a:fld>
             <a:endParaRPr lang="zh-CN" altLang="en-US" dirty="0"/>
           </a:p>
@@ -626,7 +626,7 @@
           <a:p>
             <a:fld id="{82F288E0-7875-42C4-84C8-98DBBD3BF4D2}" type="datetimeFigureOut">
               <a:rPr lang="zh-CN" altLang="en-US" smtClean="0"/>
-              <a:t>2022/3/11</a:t>
+              <a:t>2022/3/12</a:t>
             </a:fld>
             <a:endParaRPr lang="zh-CN" altLang="en-US"/>
           </a:p>
@@ -772,7 +772,7 @@
           <a:p>
             <a:fld id="{82F288E0-7875-42C4-84C8-98DBBD3BF4D2}" type="datetimeFigureOut">
               <a:rPr lang="zh-CN" altLang="en-US" smtClean="0"/>
-              <a:t>2022/3/11</a:t>
+              <a:t>2022/3/12</a:t>
             </a:fld>
             <a:endParaRPr lang="zh-CN" altLang="en-US"/>
           </a:p>
@@ -935,7 +935,7 @@
           <a:p>
             <a:fld id="{82F288E0-7875-42C4-84C8-98DBBD3BF4D2}" type="datetimeFigureOut">
               <a:rPr lang="zh-CN" altLang="en-US" smtClean="0"/>
-              <a:t>2022/3/11</a:t>
+              <a:t>2022/3/12</a:t>
             </a:fld>
             <a:endParaRPr lang="zh-CN" altLang="en-US"/>
           </a:p>
@@ -1175,7 +1175,7 @@
           <a:p>
             <a:fld id="{82F288E0-7875-42C4-84C8-98DBBD3BF4D2}" type="datetimeFigureOut">
               <a:rPr lang="zh-CN" altLang="en-US" smtClean="0"/>
-              <a:t>2022/3/11</a:t>
+              <a:t>2022/3/12</a:t>
             </a:fld>
             <a:endParaRPr lang="zh-CN" altLang="en-US"/>
           </a:p>
@@ -1399,7 +1399,7 @@
           <a:p>
             <a:fld id="{82F288E0-7875-42C4-84C8-98DBBD3BF4D2}" type="datetimeFigureOut">
               <a:rPr lang="zh-CN" altLang="en-US" smtClean="0"/>
-              <a:t>2022/3/11</a:t>
+              <a:t>2022/3/12</a:t>
             </a:fld>
             <a:endParaRPr lang="zh-CN" altLang="en-US"/>
           </a:p>
@@ -1758,7 +1758,7 @@
           <a:p>
             <a:fld id="{82F288E0-7875-42C4-84C8-98DBBD3BF4D2}" type="datetimeFigureOut">
               <a:rPr lang="zh-CN" altLang="en-US" smtClean="0"/>
-              <a:t>2022/3/11</a:t>
+              <a:t>2022/3/12</a:t>
             </a:fld>
             <a:endParaRPr lang="zh-CN" altLang="en-US"/>
           </a:p>
@@ -1870,7 +1870,7 @@
           <a:p>
             <a:fld id="{82F288E0-7875-42C4-84C8-98DBBD3BF4D2}" type="datetimeFigureOut">
               <a:rPr lang="zh-CN" altLang="en-US" smtClean="0"/>
-              <a:t>2022/3/11</a:t>
+              <a:t>2022/3/12</a:t>
             </a:fld>
             <a:endParaRPr lang="zh-CN" altLang="en-US"/>
           </a:p>
@@ -1960,7 +1960,7 @@
           <a:p>
             <a:fld id="{82F288E0-7875-42C4-84C8-98DBBD3BF4D2}" type="datetimeFigureOut">
               <a:rPr lang="zh-CN" altLang="en-US" smtClean="0"/>
-              <a:t>2022/3/11</a:t>
+              <a:t>2022/3/12</a:t>
             </a:fld>
             <a:endParaRPr lang="zh-CN" altLang="en-US"/>
           </a:p>
@@ -2207,7 +2207,7 @@
           <a:p>
             <a:fld id="{82F288E0-7875-42C4-84C8-98DBBD3BF4D2}" type="datetimeFigureOut">
               <a:rPr lang="zh-CN" altLang="en-US" smtClean="0"/>
-              <a:t>2022/3/11</a:t>
+              <a:t>2022/3/12</a:t>
             </a:fld>
             <a:endParaRPr lang="zh-CN" altLang="en-US"/>
           </a:p>
@@ -2380,7 +2380,7 @@
           <a:p>
             <a:fld id="{82F288E0-7875-42C4-84C8-98DBBD3BF4D2}" type="datetimeFigureOut">
               <a:rPr lang="zh-CN" altLang="en-US" smtClean="0"/>
-              <a:t>2022/3/11</a:t>
+              <a:t>2022/3/12</a:t>
             </a:fld>
             <a:endParaRPr lang="zh-CN" altLang="en-US"/>
           </a:p>
@@ -2594,7 +2594,7 @@
             <a:fld id="{82F288E0-7875-42C4-84C8-98DBBD3BF4D2}" type="datetimeFigureOut">
               <a:rPr lang="zh-CN" altLang="en-US" smtClean="0"/>
               <a:pPr/>
-              <a:t>2022/3/11</a:t>
+              <a:t>2022/3/12</a:t>
             </a:fld>
             <a:endParaRPr lang="zh-CN" altLang="en-US" dirty="0"/>
           </a:p>

</xml_diff>